<commit_message>
Added examples for variables, functions, classes, types and interfaces.
</commit_message>
<xml_diff>
--- a/typescript/TypeScript.pptx
+++ b/typescript/TypeScript.pptx
@@ -11,7 +11,8 @@
     <p:sldId id="259" r:id="rId5"/>
     <p:sldId id="260" r:id="rId6"/>
     <p:sldId id="261" r:id="rId7"/>
-    <p:sldId id="262" r:id="rId8"/>
+    <p:sldId id="263" r:id="rId8"/>
+    <p:sldId id="262" r:id="rId9"/>
   </p:sldIdLst>
   <p:sldSz cx="12192000" cy="6858000"/>
   <p:notesSz cx="6858000" cy="9144000"/>
@@ -110,6 +111,11 @@
       </a:defRPr>
     </a:lvl9pPr>
   </p:defaultTextStyle>
+  <p:extLst>
+    <p:ext uri="{EFAFB233-063F-42B5-8137-9DF3F51BA10A}">
+      <p15:sldGuideLst xmlns:p15="http://schemas.microsoft.com/office/powerpoint/2012/main"/>
+    </p:ext>
+  </p:extLst>
 </p:presentation>
 </file>
 
@@ -6779,6 +6785,688 @@
             <p:ph type="title"/>
           </p:nvPr>
         </p:nvSpPr>
+        <p:spPr>
+          <a:xfrm>
+            <a:off x="1046788" y="600363"/>
+            <a:ext cx="8596668" cy="1320800"/>
+          </a:xfrm>
+        </p:spPr>
+        <p:txBody>
+          <a:bodyPr/>
+          <a:lstStyle/>
+          <a:p>
+            <a:r>
+              <a:rPr lang="en-US" dirty="0" smtClean="0"/>
+              <a:t>Basic Types</a:t>
+            </a:r>
+            <a:endParaRPr lang="en-US" dirty="0"/>
+          </a:p>
+        </p:txBody>
+      </p:sp>
+      <p:sp>
+        <p:nvSpPr>
+          <p:cNvPr id="3" name="Content Placeholder 2"/>
+          <p:cNvSpPr>
+            <a:spLocks noGrp="1"/>
+          </p:cNvSpPr>
+          <p:nvPr>
+            <p:ph idx="1"/>
+          </p:nvPr>
+        </p:nvSpPr>
+        <p:spPr>
+          <a:xfrm>
+            <a:off x="677334" y="2169825"/>
+            <a:ext cx="2546157" cy="3880773"/>
+          </a:xfrm>
+        </p:spPr>
+        <p:txBody>
+          <a:bodyPr/>
+          <a:lstStyle/>
+          <a:p>
+            <a:r>
+              <a:rPr lang="en-US" dirty="0" err="1" smtClean="0"/>
+              <a:t>boolean</a:t>
+            </a:r>
+            <a:endParaRPr lang="en-US" dirty="0" smtClean="0"/>
+          </a:p>
+          <a:p>
+            <a:r>
+              <a:rPr lang="en-US" dirty="0" smtClean="0"/>
+              <a:t>number</a:t>
+            </a:r>
+          </a:p>
+          <a:p>
+            <a:r>
+              <a:rPr lang="en-US" dirty="0" smtClean="0"/>
+              <a:t>string</a:t>
+            </a:r>
+          </a:p>
+          <a:p>
+            <a:r>
+              <a:rPr lang="en-US" dirty="0"/>
+              <a:t>a</a:t>
+            </a:r>
+            <a:r>
+              <a:rPr lang="en-US" dirty="0" smtClean="0"/>
+              <a:t>rray</a:t>
+            </a:r>
+          </a:p>
+          <a:p>
+            <a:r>
+              <a:rPr lang="en-US" dirty="0" smtClean="0"/>
+              <a:t>tuple</a:t>
+            </a:r>
+          </a:p>
+          <a:p>
+            <a:r>
+              <a:rPr lang="en-US" dirty="0" err="1" smtClean="0"/>
+              <a:t>enum</a:t>
+            </a:r>
+            <a:endParaRPr lang="en-US" dirty="0" smtClean="0"/>
+          </a:p>
+          <a:p>
+            <a:endParaRPr lang="en-US" dirty="0" smtClean="0"/>
+          </a:p>
+        </p:txBody>
+      </p:sp>
+      <p:sp>
+        <p:nvSpPr>
+          <p:cNvPr id="4" name="Content Placeholder 2"/>
+          <p:cNvSpPr txBox="1">
+            <a:spLocks/>
+          </p:cNvSpPr>
+          <p:nvPr/>
+        </p:nvSpPr>
+        <p:spPr>
+          <a:xfrm>
+            <a:off x="7444511" y="2322224"/>
+            <a:ext cx="2664690" cy="3880773"/>
+          </a:xfrm>
+          <a:prstGeom prst="rect">
+            <a:avLst/>
+          </a:prstGeom>
+        </p:spPr>
+        <p:txBody>
+          <a:bodyPr vert="horz" lIns="91440" tIns="45720" rIns="91440" bIns="45720" rtlCol="0">
+            <a:normAutofit/>
+          </a:bodyPr>
+          <a:lstStyle>
+            <a:lvl1pPr marL="342900" indent="-342900" algn="l" defTabSz="457200" rtl="0" eaLnBrk="1" latinLnBrk="0" hangingPunct="1">
+              <a:spcBef>
+                <a:spcPts val="1000"/>
+              </a:spcBef>
+              <a:spcAft>
+                <a:spcPts val="0"/>
+              </a:spcAft>
+              <a:buClr>
+                <a:schemeClr val="accent1"/>
+              </a:buClr>
+              <a:buSzPct val="80000"/>
+              <a:buFont typeface="Wingdings 3" charset="2"/>
+              <a:buChar char=""/>
+              <a:defRPr sz="1800" kern="1200">
+                <a:solidFill>
+                  <a:schemeClr val="tx1">
+                    <a:lumMod val="75000"/>
+                    <a:lumOff val="25000"/>
+                  </a:schemeClr>
+                </a:solidFill>
+                <a:latin typeface="+mn-lt"/>
+                <a:ea typeface="+mn-ea"/>
+                <a:cs typeface="+mn-cs"/>
+              </a:defRPr>
+            </a:lvl1pPr>
+            <a:lvl2pPr marL="742950" indent="-285750" algn="l" defTabSz="457200" rtl="0" eaLnBrk="1" latinLnBrk="0" hangingPunct="1">
+              <a:spcBef>
+                <a:spcPts val="1000"/>
+              </a:spcBef>
+              <a:spcAft>
+                <a:spcPts val="0"/>
+              </a:spcAft>
+              <a:buClr>
+                <a:schemeClr val="accent1"/>
+              </a:buClr>
+              <a:buSzPct val="80000"/>
+              <a:buFont typeface="Wingdings 3" charset="2"/>
+              <a:buChar char=""/>
+              <a:defRPr sz="1600" kern="1200">
+                <a:solidFill>
+                  <a:schemeClr val="tx1">
+                    <a:lumMod val="75000"/>
+                    <a:lumOff val="25000"/>
+                  </a:schemeClr>
+                </a:solidFill>
+                <a:latin typeface="+mn-lt"/>
+                <a:ea typeface="+mn-ea"/>
+                <a:cs typeface="+mn-cs"/>
+              </a:defRPr>
+            </a:lvl2pPr>
+            <a:lvl3pPr marL="1143000" indent="-228600" algn="l" defTabSz="457200" rtl="0" eaLnBrk="1" latinLnBrk="0" hangingPunct="1">
+              <a:spcBef>
+                <a:spcPts val="1000"/>
+              </a:spcBef>
+              <a:spcAft>
+                <a:spcPts val="0"/>
+              </a:spcAft>
+              <a:buClr>
+                <a:schemeClr val="accent1"/>
+              </a:buClr>
+              <a:buSzPct val="80000"/>
+              <a:buFont typeface="Wingdings 3" charset="2"/>
+              <a:buChar char=""/>
+              <a:defRPr sz="1400" kern="1200">
+                <a:solidFill>
+                  <a:schemeClr val="tx1">
+                    <a:lumMod val="75000"/>
+                    <a:lumOff val="25000"/>
+                  </a:schemeClr>
+                </a:solidFill>
+                <a:latin typeface="+mn-lt"/>
+                <a:ea typeface="+mn-ea"/>
+                <a:cs typeface="+mn-cs"/>
+              </a:defRPr>
+            </a:lvl3pPr>
+            <a:lvl4pPr marL="1600200" indent="-228600" algn="l" defTabSz="457200" rtl="0" eaLnBrk="1" latinLnBrk="0" hangingPunct="1">
+              <a:spcBef>
+                <a:spcPts val="1000"/>
+              </a:spcBef>
+              <a:spcAft>
+                <a:spcPts val="0"/>
+              </a:spcAft>
+              <a:buClr>
+                <a:schemeClr val="accent1"/>
+              </a:buClr>
+              <a:buSzPct val="80000"/>
+              <a:buFont typeface="Wingdings 3" charset="2"/>
+              <a:buChar char=""/>
+              <a:defRPr sz="1200" kern="1200">
+                <a:solidFill>
+                  <a:schemeClr val="tx1">
+                    <a:lumMod val="75000"/>
+                    <a:lumOff val="25000"/>
+                  </a:schemeClr>
+                </a:solidFill>
+                <a:latin typeface="+mn-lt"/>
+                <a:ea typeface="+mn-ea"/>
+                <a:cs typeface="+mn-cs"/>
+              </a:defRPr>
+            </a:lvl4pPr>
+            <a:lvl5pPr marL="2057400" indent="-228600" algn="l" defTabSz="457200" rtl="0" eaLnBrk="1" latinLnBrk="0" hangingPunct="1">
+              <a:spcBef>
+                <a:spcPts val="1000"/>
+              </a:spcBef>
+              <a:spcAft>
+                <a:spcPts val="0"/>
+              </a:spcAft>
+              <a:buClr>
+                <a:schemeClr val="accent1"/>
+              </a:buClr>
+              <a:buSzPct val="80000"/>
+              <a:buFont typeface="Wingdings 3" charset="2"/>
+              <a:buChar char=""/>
+              <a:defRPr sz="1200" kern="1200">
+                <a:solidFill>
+                  <a:schemeClr val="tx1">
+                    <a:lumMod val="75000"/>
+                    <a:lumOff val="25000"/>
+                  </a:schemeClr>
+                </a:solidFill>
+                <a:latin typeface="+mn-lt"/>
+                <a:ea typeface="+mn-ea"/>
+                <a:cs typeface="+mn-cs"/>
+              </a:defRPr>
+            </a:lvl5pPr>
+            <a:lvl6pPr marL="2514600" indent="-228600" algn="l" defTabSz="457200" rtl="0" eaLnBrk="1" latinLnBrk="0" hangingPunct="1">
+              <a:spcBef>
+                <a:spcPts val="1000"/>
+              </a:spcBef>
+              <a:spcAft>
+                <a:spcPts val="0"/>
+              </a:spcAft>
+              <a:buClr>
+                <a:schemeClr val="accent1"/>
+              </a:buClr>
+              <a:buSzPct val="80000"/>
+              <a:buFont typeface="Wingdings 3" charset="2"/>
+              <a:buChar char=""/>
+              <a:defRPr sz="1200" kern="1200">
+                <a:solidFill>
+                  <a:schemeClr val="tx1">
+                    <a:lumMod val="75000"/>
+                    <a:lumOff val="25000"/>
+                  </a:schemeClr>
+                </a:solidFill>
+                <a:latin typeface="+mn-lt"/>
+                <a:ea typeface="+mn-ea"/>
+                <a:cs typeface="+mn-cs"/>
+              </a:defRPr>
+            </a:lvl6pPr>
+            <a:lvl7pPr marL="2971800" indent="-228600" algn="l" defTabSz="457200" rtl="0" eaLnBrk="1" latinLnBrk="0" hangingPunct="1">
+              <a:spcBef>
+                <a:spcPts val="1000"/>
+              </a:spcBef>
+              <a:spcAft>
+                <a:spcPts val="0"/>
+              </a:spcAft>
+              <a:buClr>
+                <a:schemeClr val="accent1"/>
+              </a:buClr>
+              <a:buSzPct val="80000"/>
+              <a:buFont typeface="Wingdings 3" charset="2"/>
+              <a:buChar char=""/>
+              <a:defRPr sz="1200" kern="1200">
+                <a:solidFill>
+                  <a:schemeClr val="tx1">
+                    <a:lumMod val="75000"/>
+                    <a:lumOff val="25000"/>
+                  </a:schemeClr>
+                </a:solidFill>
+                <a:latin typeface="+mn-lt"/>
+                <a:ea typeface="+mn-ea"/>
+                <a:cs typeface="+mn-cs"/>
+              </a:defRPr>
+            </a:lvl7pPr>
+            <a:lvl8pPr marL="3429000" indent="-228600" algn="l" defTabSz="457200" rtl="0" eaLnBrk="1" latinLnBrk="0" hangingPunct="1">
+              <a:spcBef>
+                <a:spcPts val="1000"/>
+              </a:spcBef>
+              <a:spcAft>
+                <a:spcPts val="0"/>
+              </a:spcAft>
+              <a:buClr>
+                <a:schemeClr val="accent1"/>
+              </a:buClr>
+              <a:buSzPct val="80000"/>
+              <a:buFont typeface="Wingdings 3" charset="2"/>
+              <a:buChar char=""/>
+              <a:defRPr sz="1200" kern="1200">
+                <a:solidFill>
+                  <a:schemeClr val="tx1">
+                    <a:lumMod val="75000"/>
+                    <a:lumOff val="25000"/>
+                  </a:schemeClr>
+                </a:solidFill>
+                <a:latin typeface="+mn-lt"/>
+                <a:ea typeface="+mn-ea"/>
+                <a:cs typeface="+mn-cs"/>
+              </a:defRPr>
+            </a:lvl8pPr>
+            <a:lvl9pPr marL="3886200" indent="-228600" algn="l" defTabSz="457200" rtl="0" eaLnBrk="1" latinLnBrk="0" hangingPunct="1">
+              <a:spcBef>
+                <a:spcPts val="1000"/>
+              </a:spcBef>
+              <a:spcAft>
+                <a:spcPts val="0"/>
+              </a:spcAft>
+              <a:buClr>
+                <a:schemeClr val="accent1"/>
+              </a:buClr>
+              <a:buSzPct val="80000"/>
+              <a:buFont typeface="Wingdings 3" charset="2"/>
+              <a:buChar char=""/>
+              <a:defRPr sz="1200" kern="1200">
+                <a:solidFill>
+                  <a:schemeClr val="tx1">
+                    <a:lumMod val="75000"/>
+                    <a:lumOff val="25000"/>
+                  </a:schemeClr>
+                </a:solidFill>
+                <a:latin typeface="+mn-lt"/>
+                <a:ea typeface="+mn-ea"/>
+                <a:cs typeface="+mn-cs"/>
+              </a:defRPr>
+            </a:lvl9pPr>
+          </a:lstStyle>
+          <a:p>
+            <a:r>
+              <a:rPr lang="en-US" dirty="0" smtClean="0"/>
+              <a:t>type</a:t>
+            </a:r>
+          </a:p>
+          <a:p>
+            <a:r>
+              <a:rPr lang="en-US" dirty="0"/>
+              <a:t>f</a:t>
+            </a:r>
+            <a:r>
+              <a:rPr lang="en-US" dirty="0" smtClean="0"/>
+              <a:t>unction</a:t>
+            </a:r>
+          </a:p>
+          <a:p>
+            <a:r>
+              <a:rPr lang="en-US" dirty="0" smtClean="0"/>
+              <a:t>interface</a:t>
+            </a:r>
+          </a:p>
+          <a:p>
+            <a:r>
+              <a:rPr lang="en-US" dirty="0" smtClean="0"/>
+              <a:t>class</a:t>
+            </a:r>
+          </a:p>
+        </p:txBody>
+      </p:sp>
+      <p:sp>
+        <p:nvSpPr>
+          <p:cNvPr id="5" name="Content Placeholder 2"/>
+          <p:cNvSpPr txBox="1">
+            <a:spLocks/>
+          </p:cNvSpPr>
+          <p:nvPr/>
+        </p:nvSpPr>
+        <p:spPr>
+          <a:xfrm>
+            <a:off x="3782293" y="2239098"/>
+            <a:ext cx="2664690" cy="3880773"/>
+          </a:xfrm>
+          <a:prstGeom prst="rect">
+            <a:avLst/>
+          </a:prstGeom>
+        </p:spPr>
+        <p:txBody>
+          <a:bodyPr vert="horz" lIns="91440" tIns="45720" rIns="91440" bIns="45720" rtlCol="0">
+            <a:normAutofit/>
+          </a:bodyPr>
+          <a:lstStyle>
+            <a:lvl1pPr marL="342900" indent="-342900" algn="l" defTabSz="457200" rtl="0" eaLnBrk="1" latinLnBrk="0" hangingPunct="1">
+              <a:spcBef>
+                <a:spcPts val="1000"/>
+              </a:spcBef>
+              <a:spcAft>
+                <a:spcPts val="0"/>
+              </a:spcAft>
+              <a:buClr>
+                <a:schemeClr val="accent1"/>
+              </a:buClr>
+              <a:buSzPct val="80000"/>
+              <a:buFont typeface="Wingdings 3" charset="2"/>
+              <a:buChar char=""/>
+              <a:defRPr sz="1800" kern="1200">
+                <a:solidFill>
+                  <a:schemeClr val="tx1">
+                    <a:lumMod val="75000"/>
+                    <a:lumOff val="25000"/>
+                  </a:schemeClr>
+                </a:solidFill>
+                <a:latin typeface="+mn-lt"/>
+                <a:ea typeface="+mn-ea"/>
+                <a:cs typeface="+mn-cs"/>
+              </a:defRPr>
+            </a:lvl1pPr>
+            <a:lvl2pPr marL="742950" indent="-285750" algn="l" defTabSz="457200" rtl="0" eaLnBrk="1" latinLnBrk="0" hangingPunct="1">
+              <a:spcBef>
+                <a:spcPts val="1000"/>
+              </a:spcBef>
+              <a:spcAft>
+                <a:spcPts val="0"/>
+              </a:spcAft>
+              <a:buClr>
+                <a:schemeClr val="accent1"/>
+              </a:buClr>
+              <a:buSzPct val="80000"/>
+              <a:buFont typeface="Wingdings 3" charset="2"/>
+              <a:buChar char=""/>
+              <a:defRPr sz="1600" kern="1200">
+                <a:solidFill>
+                  <a:schemeClr val="tx1">
+                    <a:lumMod val="75000"/>
+                    <a:lumOff val="25000"/>
+                  </a:schemeClr>
+                </a:solidFill>
+                <a:latin typeface="+mn-lt"/>
+                <a:ea typeface="+mn-ea"/>
+                <a:cs typeface="+mn-cs"/>
+              </a:defRPr>
+            </a:lvl2pPr>
+            <a:lvl3pPr marL="1143000" indent="-228600" algn="l" defTabSz="457200" rtl="0" eaLnBrk="1" latinLnBrk="0" hangingPunct="1">
+              <a:spcBef>
+                <a:spcPts val="1000"/>
+              </a:spcBef>
+              <a:spcAft>
+                <a:spcPts val="0"/>
+              </a:spcAft>
+              <a:buClr>
+                <a:schemeClr val="accent1"/>
+              </a:buClr>
+              <a:buSzPct val="80000"/>
+              <a:buFont typeface="Wingdings 3" charset="2"/>
+              <a:buChar char=""/>
+              <a:defRPr sz="1400" kern="1200">
+                <a:solidFill>
+                  <a:schemeClr val="tx1">
+                    <a:lumMod val="75000"/>
+                    <a:lumOff val="25000"/>
+                  </a:schemeClr>
+                </a:solidFill>
+                <a:latin typeface="+mn-lt"/>
+                <a:ea typeface="+mn-ea"/>
+                <a:cs typeface="+mn-cs"/>
+              </a:defRPr>
+            </a:lvl3pPr>
+            <a:lvl4pPr marL="1600200" indent="-228600" algn="l" defTabSz="457200" rtl="0" eaLnBrk="1" latinLnBrk="0" hangingPunct="1">
+              <a:spcBef>
+                <a:spcPts val="1000"/>
+              </a:spcBef>
+              <a:spcAft>
+                <a:spcPts val="0"/>
+              </a:spcAft>
+              <a:buClr>
+                <a:schemeClr val="accent1"/>
+              </a:buClr>
+              <a:buSzPct val="80000"/>
+              <a:buFont typeface="Wingdings 3" charset="2"/>
+              <a:buChar char=""/>
+              <a:defRPr sz="1200" kern="1200">
+                <a:solidFill>
+                  <a:schemeClr val="tx1">
+                    <a:lumMod val="75000"/>
+                    <a:lumOff val="25000"/>
+                  </a:schemeClr>
+                </a:solidFill>
+                <a:latin typeface="+mn-lt"/>
+                <a:ea typeface="+mn-ea"/>
+                <a:cs typeface="+mn-cs"/>
+              </a:defRPr>
+            </a:lvl4pPr>
+            <a:lvl5pPr marL="2057400" indent="-228600" algn="l" defTabSz="457200" rtl="0" eaLnBrk="1" latinLnBrk="0" hangingPunct="1">
+              <a:spcBef>
+                <a:spcPts val="1000"/>
+              </a:spcBef>
+              <a:spcAft>
+                <a:spcPts val="0"/>
+              </a:spcAft>
+              <a:buClr>
+                <a:schemeClr val="accent1"/>
+              </a:buClr>
+              <a:buSzPct val="80000"/>
+              <a:buFont typeface="Wingdings 3" charset="2"/>
+              <a:buChar char=""/>
+              <a:defRPr sz="1200" kern="1200">
+                <a:solidFill>
+                  <a:schemeClr val="tx1">
+                    <a:lumMod val="75000"/>
+                    <a:lumOff val="25000"/>
+                  </a:schemeClr>
+                </a:solidFill>
+                <a:latin typeface="+mn-lt"/>
+                <a:ea typeface="+mn-ea"/>
+                <a:cs typeface="+mn-cs"/>
+              </a:defRPr>
+            </a:lvl5pPr>
+            <a:lvl6pPr marL="2514600" indent="-228600" algn="l" defTabSz="457200" rtl="0" eaLnBrk="1" latinLnBrk="0" hangingPunct="1">
+              <a:spcBef>
+                <a:spcPts val="1000"/>
+              </a:spcBef>
+              <a:spcAft>
+                <a:spcPts val="0"/>
+              </a:spcAft>
+              <a:buClr>
+                <a:schemeClr val="accent1"/>
+              </a:buClr>
+              <a:buSzPct val="80000"/>
+              <a:buFont typeface="Wingdings 3" charset="2"/>
+              <a:buChar char=""/>
+              <a:defRPr sz="1200" kern="1200">
+                <a:solidFill>
+                  <a:schemeClr val="tx1">
+                    <a:lumMod val="75000"/>
+                    <a:lumOff val="25000"/>
+                  </a:schemeClr>
+                </a:solidFill>
+                <a:latin typeface="+mn-lt"/>
+                <a:ea typeface="+mn-ea"/>
+                <a:cs typeface="+mn-cs"/>
+              </a:defRPr>
+            </a:lvl6pPr>
+            <a:lvl7pPr marL="2971800" indent="-228600" algn="l" defTabSz="457200" rtl="0" eaLnBrk="1" latinLnBrk="0" hangingPunct="1">
+              <a:spcBef>
+                <a:spcPts val="1000"/>
+              </a:spcBef>
+              <a:spcAft>
+                <a:spcPts val="0"/>
+              </a:spcAft>
+              <a:buClr>
+                <a:schemeClr val="accent1"/>
+              </a:buClr>
+              <a:buSzPct val="80000"/>
+              <a:buFont typeface="Wingdings 3" charset="2"/>
+              <a:buChar char=""/>
+              <a:defRPr sz="1200" kern="1200">
+                <a:solidFill>
+                  <a:schemeClr val="tx1">
+                    <a:lumMod val="75000"/>
+                    <a:lumOff val="25000"/>
+                  </a:schemeClr>
+                </a:solidFill>
+                <a:latin typeface="+mn-lt"/>
+                <a:ea typeface="+mn-ea"/>
+                <a:cs typeface="+mn-cs"/>
+              </a:defRPr>
+            </a:lvl7pPr>
+            <a:lvl8pPr marL="3429000" indent="-228600" algn="l" defTabSz="457200" rtl="0" eaLnBrk="1" latinLnBrk="0" hangingPunct="1">
+              <a:spcBef>
+                <a:spcPts val="1000"/>
+              </a:spcBef>
+              <a:spcAft>
+                <a:spcPts val="0"/>
+              </a:spcAft>
+              <a:buClr>
+                <a:schemeClr val="accent1"/>
+              </a:buClr>
+              <a:buSzPct val="80000"/>
+              <a:buFont typeface="Wingdings 3" charset="2"/>
+              <a:buChar char=""/>
+              <a:defRPr sz="1200" kern="1200">
+                <a:solidFill>
+                  <a:schemeClr val="tx1">
+                    <a:lumMod val="75000"/>
+                    <a:lumOff val="25000"/>
+                  </a:schemeClr>
+                </a:solidFill>
+                <a:latin typeface="+mn-lt"/>
+                <a:ea typeface="+mn-ea"/>
+                <a:cs typeface="+mn-cs"/>
+              </a:defRPr>
+            </a:lvl8pPr>
+            <a:lvl9pPr marL="3886200" indent="-228600" algn="l" defTabSz="457200" rtl="0" eaLnBrk="1" latinLnBrk="0" hangingPunct="1">
+              <a:spcBef>
+                <a:spcPts val="1000"/>
+              </a:spcBef>
+              <a:spcAft>
+                <a:spcPts val="0"/>
+              </a:spcAft>
+              <a:buClr>
+                <a:schemeClr val="accent1"/>
+              </a:buClr>
+              <a:buSzPct val="80000"/>
+              <a:buFont typeface="Wingdings 3" charset="2"/>
+              <a:buChar char=""/>
+              <a:defRPr sz="1200" kern="1200">
+                <a:solidFill>
+                  <a:schemeClr val="tx1">
+                    <a:lumMod val="75000"/>
+                    <a:lumOff val="25000"/>
+                  </a:schemeClr>
+                </a:solidFill>
+                <a:latin typeface="+mn-lt"/>
+                <a:ea typeface="+mn-ea"/>
+                <a:cs typeface="+mn-cs"/>
+              </a:defRPr>
+            </a:lvl9pPr>
+          </a:lstStyle>
+          <a:p>
+            <a:r>
+              <a:rPr lang="en-US" dirty="0" smtClean="0"/>
+              <a:t>any</a:t>
+            </a:r>
+          </a:p>
+          <a:p>
+            <a:r>
+              <a:rPr lang="en-US" dirty="0" smtClean="0"/>
+              <a:t>void</a:t>
+            </a:r>
+          </a:p>
+          <a:p>
+            <a:r>
+              <a:rPr lang="en-US" dirty="0" smtClean="0"/>
+              <a:t>null</a:t>
+            </a:r>
+          </a:p>
+          <a:p>
+            <a:r>
+              <a:rPr lang="en-US" dirty="0" smtClean="0"/>
+              <a:t>undefined</a:t>
+            </a:r>
+          </a:p>
+          <a:p>
+            <a:r>
+              <a:rPr lang="en-US" dirty="0" smtClean="0"/>
+              <a:t>never</a:t>
+            </a:r>
+          </a:p>
+        </p:txBody>
+      </p:sp>
+    </p:spTree>
+    <p:extLst>
+      <p:ext uri="{BB962C8B-B14F-4D97-AF65-F5344CB8AC3E}">
+        <p14:creationId xmlns:p14="http://schemas.microsoft.com/office/powerpoint/2010/main" val="2891711537"/>
+      </p:ext>
+    </p:extLst>
+  </p:cSld>
+  <p:clrMapOvr>
+    <a:masterClrMapping/>
+  </p:clrMapOvr>
+</p:sld>
+</file>
+
+<file path=ppt/slides/slide8.xml><?xml version="1.0" encoding="utf-8"?>
+<p:sld xmlns:a="http://schemas.openxmlformats.org/drawingml/2006/main" xmlns:r="http://schemas.openxmlformats.org/officeDocument/2006/relationships" xmlns:p="http://schemas.openxmlformats.org/presentationml/2006/main">
+  <p:cSld>
+    <p:spTree>
+      <p:nvGrpSpPr>
+        <p:cNvPr id="1" name=""/>
+        <p:cNvGrpSpPr/>
+        <p:nvPr/>
+      </p:nvGrpSpPr>
+      <p:grpSpPr>
+        <a:xfrm>
+          <a:off x="0" y="0"/>
+          <a:ext cx="0" cy="0"/>
+          <a:chOff x="0" y="0"/>
+          <a:chExt cx="0" cy="0"/>
+        </a:xfrm>
+      </p:grpSpPr>
+      <p:sp>
+        <p:nvSpPr>
+          <p:cNvPr id="2" name="Title 1"/>
+          <p:cNvSpPr>
+            <a:spLocks noGrp="1"/>
+          </p:cNvSpPr>
+          <p:nvPr>
+            <p:ph type="title"/>
+          </p:nvPr>
+        </p:nvSpPr>
         <p:spPr/>
         <p:txBody>
           <a:bodyPr/>

</xml_diff>

<commit_message>
Added examples for node, modules and decorators.
</commit_message>
<xml_diff>
--- a/typescript/TypeScript.pptx
+++ b/typescript/TypeScript.pptx
@@ -13,6 +13,7 @@
     <p:sldId id="261" r:id="rId7"/>
     <p:sldId id="263" r:id="rId8"/>
     <p:sldId id="262" r:id="rId9"/>
+    <p:sldId id="264" r:id="rId10"/>
   </p:sldIdLst>
   <p:sldSz cx="12192000" cy="6858000"/>
   <p:notesSz cx="6858000" cy="9144000"/>
@@ -5833,6 +5834,36 @@
           </a:p>
         </p:txBody>
       </p:sp>
+      <p:pic>
+        <p:nvPicPr>
+          <p:cNvPr id="4" name="Picture 3"/>
+          <p:cNvPicPr>
+            <a:picLocks noChangeAspect="1"/>
+          </p:cNvPicPr>
+          <p:nvPr/>
+        </p:nvPicPr>
+        <p:blipFill>
+          <a:blip r:embed="rId2">
+            <a:extLst>
+              <a:ext uri="{28A0092B-C50C-407E-A947-70E740481C1C}">
+                <a14:useLocalDpi xmlns:a14="http://schemas.microsoft.com/office/drawing/2010/main" val="0"/>
+              </a:ext>
+            </a:extLst>
+          </a:blip>
+          <a:stretch>
+            <a:fillRect/>
+          </a:stretch>
+        </p:blipFill>
+        <p:spPr>
+          <a:xfrm>
+            <a:off x="1608667" y="2013525"/>
+            <a:ext cx="3925455" cy="2944091"/>
+          </a:xfrm>
+          <a:prstGeom prst="rect">
+            <a:avLst/>
+          </a:prstGeom>
+        </p:spPr>
+      </p:pic>
     </p:spTree>
     <p:extLst>
       <p:ext uri="{BB962C8B-B14F-4D97-AF65-F5344CB8AC3E}">
@@ -7120,18 +7151,15 @@
           <a:p>
             <a:r>
               <a:rPr lang="en-US" dirty="0" smtClean="0"/>
-              <a:t>type</a:t>
+              <a:t>function</a:t>
             </a:r>
           </a:p>
           <a:p>
             <a:r>
               <a:rPr lang="en-US" dirty="0"/>
-              <a:t>f</a:t>
-            </a:r>
-            <a:r>
-              <a:rPr lang="en-US" dirty="0" smtClean="0"/>
-              <a:t>unction</a:t>
-            </a:r>
+              <a:t>class</a:t>
+            </a:r>
+            <a:endParaRPr lang="en-US" dirty="0" smtClean="0"/>
           </a:p>
           <a:p>
             <a:r>
@@ -7141,9 +7169,10 @@
           </a:p>
           <a:p>
             <a:r>
-              <a:rPr lang="en-US" dirty="0" smtClean="0"/>
-              <a:t>class</a:t>
-            </a:r>
+              <a:rPr lang="en-US" dirty="0"/>
+              <a:t>type</a:t>
+            </a:r>
+            <a:endParaRPr lang="en-US" dirty="0" smtClean="0"/>
           </a:p>
         </p:txBody>
       </p:sp>
@@ -7424,6 +7453,15 @@
               <a:rPr lang="en-US" dirty="0" smtClean="0"/>
               <a:t>never</a:t>
             </a:r>
+          </a:p>
+          <a:p>
+            <a:r>
+              <a:rPr lang="en-US" dirty="0" smtClean="0"/>
+              <a:t>generic</a:t>
+            </a:r>
+          </a:p>
+          <a:p>
+            <a:endParaRPr lang="en-US" dirty="0" smtClean="0"/>
           </a:p>
         </p:txBody>
       </p:sp>
@@ -7663,6 +7701,94 @@
     <p:extLst>
       <p:ext uri="{BB962C8B-B14F-4D97-AF65-F5344CB8AC3E}">
         <p14:creationId xmlns:p14="http://schemas.microsoft.com/office/powerpoint/2010/main" val="3549660828"/>
+      </p:ext>
+    </p:extLst>
+  </p:cSld>
+  <p:clrMapOvr>
+    <a:masterClrMapping/>
+  </p:clrMapOvr>
+</p:sld>
+</file>
+
+<file path=ppt/slides/slide9.xml><?xml version="1.0" encoding="utf-8"?>
+<p:sld xmlns:a="http://schemas.openxmlformats.org/drawingml/2006/main" xmlns:r="http://schemas.openxmlformats.org/officeDocument/2006/relationships" xmlns:p="http://schemas.openxmlformats.org/presentationml/2006/main">
+  <p:cSld>
+    <p:spTree>
+      <p:nvGrpSpPr>
+        <p:cNvPr id="1" name=""/>
+        <p:cNvGrpSpPr/>
+        <p:nvPr/>
+      </p:nvGrpSpPr>
+      <p:grpSpPr>
+        <a:xfrm>
+          <a:off x="0" y="0"/>
+          <a:ext cx="0" cy="0"/>
+          <a:chOff x="0" y="0"/>
+          <a:chExt cx="0" cy="0"/>
+        </a:xfrm>
+      </p:grpSpPr>
+      <p:sp>
+        <p:nvSpPr>
+          <p:cNvPr id="2" name="Title 1"/>
+          <p:cNvSpPr>
+            <a:spLocks noGrp="1"/>
+          </p:cNvSpPr>
+          <p:nvPr>
+            <p:ph type="ctrTitle"/>
+          </p:nvPr>
+        </p:nvSpPr>
+        <p:spPr>
+          <a:xfrm>
+            <a:off x="1802631" y="381771"/>
+            <a:ext cx="7766936" cy="1646302"/>
+          </a:xfrm>
+        </p:spPr>
+        <p:txBody>
+          <a:bodyPr/>
+          <a:lstStyle/>
+          <a:p>
+            <a:r>
+              <a:rPr lang="en-US" dirty="0" smtClean="0"/>
+              <a:t>Questions?</a:t>
+            </a:r>
+            <a:endParaRPr lang="en-US" dirty="0"/>
+          </a:p>
+        </p:txBody>
+      </p:sp>
+      <p:pic>
+        <p:nvPicPr>
+          <p:cNvPr id="4" name="Picture 3"/>
+          <p:cNvPicPr>
+            <a:picLocks noChangeAspect="1"/>
+          </p:cNvPicPr>
+          <p:nvPr/>
+        </p:nvPicPr>
+        <p:blipFill>
+          <a:blip r:embed="rId2">
+            <a:extLst>
+              <a:ext uri="{28A0092B-C50C-407E-A947-70E740481C1C}">
+                <a14:useLocalDpi xmlns:a14="http://schemas.microsoft.com/office/drawing/2010/main" val="0"/>
+              </a:ext>
+            </a:extLst>
+          </a:blip>
+          <a:stretch>
+            <a:fillRect/>
+          </a:stretch>
+        </p:blipFill>
+        <p:spPr>
+          <a:xfrm>
+            <a:off x="3094180" y="2894061"/>
+            <a:ext cx="5364703" cy="2682352"/>
+          </a:xfrm>
+          <a:prstGeom prst="rect">
+            <a:avLst/>
+          </a:prstGeom>
+        </p:spPr>
+      </p:pic>
+    </p:spTree>
+    <p:extLst>
+      <p:ext uri="{BB962C8B-B14F-4D97-AF65-F5344CB8AC3E}">
+        <p14:creationId xmlns:p14="http://schemas.microsoft.com/office/powerpoint/2010/main" val="4063475319"/>
       </p:ext>
     </p:extLst>
   </p:cSld>

</xml_diff>

<commit_message>
Added template for angular1 and webpack.
</commit_message>
<xml_diff>
--- a/typescript/TypeScript.pptx
+++ b/typescript/TypeScript.pptx
@@ -13,7 +13,8 @@
     <p:sldId id="261" r:id="rId7"/>
     <p:sldId id="263" r:id="rId8"/>
     <p:sldId id="262" r:id="rId9"/>
-    <p:sldId id="264" r:id="rId10"/>
+    <p:sldId id="265" r:id="rId10"/>
+    <p:sldId id="264" r:id="rId11"/>
   </p:sldIdLst>
   <p:sldSz cx="12192000" cy="6858000"/>
   <p:notesSz cx="6858000" cy="9144000"/>
@@ -5877,6 +5878,94 @@
 </p:sld>
 </file>
 
+<file path=ppt/slides/slide10.xml><?xml version="1.0" encoding="utf-8"?>
+<p:sld xmlns:a="http://schemas.openxmlformats.org/drawingml/2006/main" xmlns:r="http://schemas.openxmlformats.org/officeDocument/2006/relationships" xmlns:p="http://schemas.openxmlformats.org/presentationml/2006/main">
+  <p:cSld>
+    <p:spTree>
+      <p:nvGrpSpPr>
+        <p:cNvPr id="1" name=""/>
+        <p:cNvGrpSpPr/>
+        <p:nvPr/>
+      </p:nvGrpSpPr>
+      <p:grpSpPr>
+        <a:xfrm>
+          <a:off x="0" y="0"/>
+          <a:ext cx="0" cy="0"/>
+          <a:chOff x="0" y="0"/>
+          <a:chExt cx="0" cy="0"/>
+        </a:xfrm>
+      </p:grpSpPr>
+      <p:sp>
+        <p:nvSpPr>
+          <p:cNvPr id="2" name="Title 1"/>
+          <p:cNvSpPr>
+            <a:spLocks noGrp="1"/>
+          </p:cNvSpPr>
+          <p:nvPr>
+            <p:ph type="ctrTitle"/>
+          </p:nvPr>
+        </p:nvSpPr>
+        <p:spPr>
+          <a:xfrm>
+            <a:off x="1802631" y="381771"/>
+            <a:ext cx="7766936" cy="1646302"/>
+          </a:xfrm>
+        </p:spPr>
+        <p:txBody>
+          <a:bodyPr/>
+          <a:lstStyle/>
+          <a:p>
+            <a:r>
+              <a:rPr lang="en-US" dirty="0" smtClean="0"/>
+              <a:t>Questions?</a:t>
+            </a:r>
+            <a:endParaRPr lang="en-US" dirty="0"/>
+          </a:p>
+        </p:txBody>
+      </p:sp>
+      <p:pic>
+        <p:nvPicPr>
+          <p:cNvPr id="4" name="Picture 3"/>
+          <p:cNvPicPr>
+            <a:picLocks noChangeAspect="1"/>
+          </p:cNvPicPr>
+          <p:nvPr/>
+        </p:nvPicPr>
+        <p:blipFill>
+          <a:blip r:embed="rId2">
+            <a:extLst>
+              <a:ext uri="{28A0092B-C50C-407E-A947-70E740481C1C}">
+                <a14:useLocalDpi xmlns:a14="http://schemas.microsoft.com/office/drawing/2010/main" val="0"/>
+              </a:ext>
+            </a:extLst>
+          </a:blip>
+          <a:stretch>
+            <a:fillRect/>
+          </a:stretch>
+        </p:blipFill>
+        <p:spPr>
+          <a:xfrm>
+            <a:off x="3094180" y="2894061"/>
+            <a:ext cx="5364703" cy="2682352"/>
+          </a:xfrm>
+          <a:prstGeom prst="rect">
+            <a:avLst/>
+          </a:prstGeom>
+        </p:spPr>
+      </p:pic>
+    </p:spTree>
+    <p:extLst>
+      <p:ext uri="{BB962C8B-B14F-4D97-AF65-F5344CB8AC3E}">
+        <p14:creationId xmlns:p14="http://schemas.microsoft.com/office/powerpoint/2010/main" val="4063475319"/>
+      </p:ext>
+    </p:extLst>
+  </p:cSld>
+  <p:clrMapOvr>
+    <a:masterClrMapping/>
+  </p:clrMapOvr>
+</p:sld>
+</file>
+
 <file path=ppt/slides/slide2.xml><?xml version="1.0" encoding="utf-8"?>
 <p:sld xmlns:a="http://schemas.openxmlformats.org/drawingml/2006/main" xmlns:r="http://schemas.openxmlformats.org/officeDocument/2006/relationships" xmlns:p="http://schemas.openxmlformats.org/presentationml/2006/main">
   <p:cSld>
@@ -7734,61 +7823,99 @@
             <a:spLocks noGrp="1"/>
           </p:cNvSpPr>
           <p:nvPr>
-            <p:ph type="ctrTitle"/>
-          </p:nvPr>
-        </p:nvSpPr>
-        <p:spPr>
-          <a:xfrm>
-            <a:off x="1802631" y="381771"/>
-            <a:ext cx="7766936" cy="1646302"/>
-          </a:xfrm>
-        </p:spPr>
+            <p:ph type="title"/>
+          </p:nvPr>
+        </p:nvSpPr>
+        <p:spPr/>
         <p:txBody>
           <a:bodyPr/>
           <a:lstStyle/>
           <a:p>
             <a:r>
+              <a:rPr lang="en-US" smtClean="0"/>
+              <a:t>What next?</a:t>
+            </a:r>
+            <a:endParaRPr lang="en-US" dirty="0"/>
+          </a:p>
+        </p:txBody>
+      </p:sp>
+      <p:sp>
+        <p:nvSpPr>
+          <p:cNvPr id="3" name="Content Placeholder 2"/>
+          <p:cNvSpPr>
+            <a:spLocks noGrp="1"/>
+          </p:cNvSpPr>
+          <p:nvPr>
+            <p:ph idx="1"/>
+          </p:nvPr>
+        </p:nvSpPr>
+        <p:spPr/>
+        <p:txBody>
+          <a:bodyPr/>
+          <a:lstStyle/>
+          <a:p>
+            <a:r>
               <a:rPr lang="en-US" dirty="0" smtClean="0"/>
-              <a:t>Questions?</a:t>
-            </a:r>
-            <a:endParaRPr lang="en-US" dirty="0"/>
-          </a:p>
-        </p:txBody>
-      </p:sp>
-      <p:pic>
-        <p:nvPicPr>
-          <p:cNvPr id="4" name="Picture 3"/>
-          <p:cNvPicPr>
-            <a:picLocks noChangeAspect="1"/>
-          </p:cNvPicPr>
-          <p:nvPr/>
-        </p:nvPicPr>
-        <p:blipFill>
-          <a:blip r:embed="rId2">
-            <a:extLst>
-              <a:ext uri="{28A0092B-C50C-407E-A947-70E740481C1C}">
-                <a14:useLocalDpi xmlns:a14="http://schemas.microsoft.com/office/drawing/2010/main" val="0"/>
-              </a:ext>
-            </a:extLst>
-          </a:blip>
-          <a:stretch>
-            <a:fillRect/>
-          </a:stretch>
-        </p:blipFill>
-        <p:spPr>
-          <a:xfrm>
-            <a:off x="3094180" y="2894061"/>
-            <a:ext cx="5364703" cy="2682352"/>
-          </a:xfrm>
-          <a:prstGeom prst="rect">
-            <a:avLst/>
-          </a:prstGeom>
-        </p:spPr>
-      </p:pic>
+              <a:t>Read </a:t>
+            </a:r>
+            <a:r>
+              <a:rPr lang="en-US" dirty="0"/>
+              <a:t>official documentation: </a:t>
+            </a:r>
+            <a:r>
+              <a:rPr lang="en-US" dirty="0">
+                <a:hlinkClick r:id="rId2"/>
+              </a:rPr>
+              <a:t>https://</a:t>
+            </a:r>
+            <a:r>
+              <a:rPr lang="en-US" dirty="0" smtClean="0">
+                <a:hlinkClick r:id="rId2"/>
+              </a:rPr>
+              <a:t>www.typescriptlang.org/docs/home.html</a:t>
+            </a:r>
+            <a:endParaRPr lang="en-US" dirty="0" smtClean="0"/>
+          </a:p>
+          <a:p>
+            <a:endParaRPr lang="en-US" dirty="0"/>
+          </a:p>
+          <a:p>
+            <a:r>
+              <a:rPr lang="en-US" dirty="0" smtClean="0"/>
+              <a:t>Examples for this presentation are here: </a:t>
+            </a:r>
+            <a:r>
+              <a:rPr lang="en-US" dirty="0" smtClean="0">
+                <a:hlinkClick r:id="rId3"/>
+              </a:rPr>
+              <a:t>https</a:t>
+            </a:r>
+            <a:r>
+              <a:rPr lang="en-US" dirty="0">
+                <a:hlinkClick r:id="rId3"/>
+              </a:rPr>
+              <a:t>://</a:t>
+            </a:r>
+            <a:r>
+              <a:rPr lang="en-US" dirty="0" smtClean="0">
+                <a:hlinkClick r:id="rId3"/>
+              </a:rPr>
+              <a:t>github.com/Mishurin/frontend-examples</a:t>
+            </a:r>
+            <a:endParaRPr lang="en-US" dirty="0" smtClean="0"/>
+          </a:p>
+          <a:p>
+            <a:pPr marL="0" indent="0">
+              <a:buNone/>
+            </a:pPr>
+            <a:endParaRPr lang="en-US" dirty="0"/>
+          </a:p>
+        </p:txBody>
+      </p:sp>
     </p:spTree>
     <p:extLst>
       <p:ext uri="{BB962C8B-B14F-4D97-AF65-F5344CB8AC3E}">
-        <p14:creationId xmlns:p14="http://schemas.microsoft.com/office/powerpoint/2010/main" val="4063475319"/>
+        <p14:creationId xmlns:p14="http://schemas.microsoft.com/office/powerpoint/2010/main" val="1573375304"/>
       </p:ext>
     </p:extLst>
   </p:cSld>

</xml_diff>

<commit_message>
More comprehensive example of method decoration.
</commit_message>
<xml_diff>
--- a/typescript/TypeScript.pptx
+++ b/typescript/TypeScript.pptx
@@ -7832,7 +7832,7 @@
           <a:lstStyle/>
           <a:p>
             <a:r>
-              <a:rPr lang="en-US" smtClean="0"/>
+              <a:rPr lang="en-US" dirty="0" smtClean="0"/>
               <a:t>What next?</a:t>
             </a:r>
             <a:endParaRPr lang="en-US" dirty="0"/>
@@ -7902,6 +7902,40 @@
               </a:rPr>
               <a:t>github.com/Mishurin/frontend-examples</a:t>
             </a:r>
+            <a:endParaRPr lang="pl-PL" dirty="0" smtClean="0"/>
+          </a:p>
+          <a:p>
+            <a:endParaRPr lang="pl-PL" dirty="0"/>
+          </a:p>
+          <a:p>
+            <a:r>
+              <a:rPr lang="pl-PL" dirty="0" smtClean="0"/>
+              <a:t>About decorators: </a:t>
+            </a:r>
+            <a:br>
+              <a:rPr lang="pl-PL" dirty="0" smtClean="0"/>
+            </a:br>
+            <a:r>
+              <a:rPr lang="en-US" dirty="0" smtClean="0">
+                <a:hlinkClick r:id="rId4"/>
+              </a:rPr>
+              <a:t>http</a:t>
+            </a:r>
+            <a:r>
+              <a:rPr lang="en-US" dirty="0">
+                <a:hlinkClick r:id="rId4"/>
+              </a:rPr>
+              <a:t>://</a:t>
+            </a:r>
+            <a:r>
+              <a:rPr lang="en-US" dirty="0" smtClean="0">
+                <a:hlinkClick r:id="rId4"/>
+              </a:rPr>
+              <a:t>blog.wolksoftware.com/decorators-reflection-javascript-typescript</a:t>
+            </a:r>
+            <a:endParaRPr lang="pl-PL" smtClean="0"/>
+          </a:p>
+          <a:p>
             <a:endParaRPr lang="en-US" dirty="0" smtClean="0"/>
           </a:p>
           <a:p>

</xml_diff>